<commit_message>
Again update to Presentations
</commit_message>
<xml_diff>
--- a/docs/Xtend_API_and_DSL_Design_Patterns_EclipseConFrance2016.pptx
+++ b/docs/Xtend_API_and_DSL_Design_Patterns_EclipseConFrance2016.pptx
@@ -5,7 +5,7 @@
     <p:sldMasterId id="2147483790" r:id="rId1"/>
   </p:sldMasterIdLst>
   <p:notesMasterIdLst>
-    <p:notesMasterId r:id="rId41"/>
+    <p:notesMasterId r:id="rId42"/>
   </p:notesMasterIdLst>
   <p:sldIdLst>
     <p:sldId id="257" r:id="rId2"/>
@@ -45,8 +45,9 @@
     <p:sldId id="314" r:id="rId36"/>
     <p:sldId id="327" r:id="rId37"/>
     <p:sldId id="301" r:id="rId38"/>
-    <p:sldId id="304" r:id="rId39"/>
-    <p:sldId id="267" r:id="rId40"/>
+    <p:sldId id="340" r:id="rId39"/>
+    <p:sldId id="304" r:id="rId40"/>
+    <p:sldId id="267" r:id="rId41"/>
   </p:sldIdLst>
   <p:sldSz cx="9144000" cy="6858000" type="screen4x3"/>
   <p:notesSz cx="6858000" cy="9144000"/>
@@ -258,7 +259,7 @@
           <a:p>
             <a:fld id="{9E2B4FE6-1CE3-304D-A5AE-188A738F9CD6}" type="datetimeFigureOut">
               <a:rPr lang="de-DE" smtClean="0"/>
-              <a:t>18.04.2016</a:t>
+              <a:t>06.06.2016</a:t>
             </a:fld>
             <a:endParaRPr lang="de-DE" dirty="0"/>
           </a:p>
@@ -5273,11 +5274,7 @@
             </a:r>
             <a:r>
               <a:rPr lang="de-DE" dirty="0" smtClean="0"/>
-              <a:t> </a:t>
-            </a:r>
-            <a:r>
-              <a:rPr lang="de-DE" dirty="0" smtClean="0"/>
-              <a:t>same API</a:t>
+              <a:t> same API</a:t>
             </a:r>
             <a:r>
               <a:rPr lang="de-DE" baseline="0" dirty="0" smtClean="0"/>
@@ -11358,7 +11355,6 @@
               <a:rPr lang="en-US" dirty="0"/>
               <a:t> API and DSL Design Patterns</a:t>
             </a:r>
-            <a:endParaRPr lang="en-US" dirty="0"/>
           </a:p>
         </p:txBody>
       </p:sp>
@@ -12306,7 +12302,6 @@
               <a:rPr lang="en-US" dirty="0"/>
               <a:t> API and DSL Design Patterns</a:t>
             </a:r>
-            <a:endParaRPr lang="en-US" dirty="0"/>
           </a:p>
         </p:txBody>
       </p:sp>
@@ -13809,7 +13804,6 @@
               <a:rPr lang="en-US" dirty="0"/>
               <a:t> API and DSL Design Patterns</a:t>
             </a:r>
-            <a:endParaRPr lang="en-US" dirty="0"/>
           </a:p>
         </p:txBody>
       </p:sp>
@@ -14857,7 +14851,6 @@
               <a:rPr lang="en-US" dirty="0"/>
               <a:t> API and DSL Design Patterns</a:t>
             </a:r>
-            <a:endParaRPr lang="en-US" dirty="0"/>
           </a:p>
         </p:txBody>
       </p:sp>
@@ -14988,15 +14981,7 @@
             </a:pPr>
             <a:r>
               <a:rPr lang="en-US" dirty="0" smtClean="0"/>
-              <a:t>Can </a:t>
-            </a:r>
-            <a:r>
-              <a:rPr lang="en-US" dirty="0" smtClean="0"/>
-              <a:t>safely be </a:t>
-            </a:r>
-            <a:r>
-              <a:rPr lang="en-US" dirty="0" smtClean="0"/>
-              <a:t>shared between threads</a:t>
+              <a:t>Can safely be shared between threads</a:t>
             </a:r>
           </a:p>
           <a:p>
@@ -15094,7 +15079,6 @@
               <a:rPr lang="en-US" dirty="0"/>
               <a:t> API and DSL Design Patterns</a:t>
             </a:r>
-            <a:endParaRPr lang="en-US" dirty="0"/>
           </a:p>
         </p:txBody>
       </p:sp>
@@ -15635,13 +15619,8 @@
             </a:pPr>
             <a:r>
               <a:rPr lang="en-US" dirty="0" smtClean="0"/>
-              <a:t>Immutable objects are tricky in some </a:t>
-            </a:r>
-            <a:r>
-              <a:rPr lang="en-US" dirty="0" smtClean="0"/>
-              <a:t>cases </a:t>
-            </a:r>
-            <a:endParaRPr lang="en-US" dirty="0" smtClean="0"/>
+              <a:t>Immutable objects are tricky in some cases </a:t>
+            </a:r>
           </a:p>
           <a:p>
             <a:pPr>
@@ -18370,11 +18349,7 @@
             </a:pPr>
             <a:r>
               <a:rPr lang="en-US" b="1" dirty="0" smtClean="0"/>
-              <a:t>Cyclic references will come back to bite </a:t>
-            </a:r>
-            <a:r>
-              <a:rPr lang="en-US" b="1" dirty="0" smtClean="0"/>
-              <a:t>you on manipulation!</a:t>
+              <a:t>Cyclic references will come back to bite you on manipulation!</a:t>
             </a:r>
             <a:r>
               <a:rPr lang="en-US" dirty="0" smtClean="0"/>
@@ -21341,7 +21316,6 @@
               <a:rPr lang="en-US" dirty="0"/>
               <a:t> API and DSL Design Patterns</a:t>
             </a:r>
-            <a:endParaRPr lang="en-US" dirty="0"/>
           </a:p>
         </p:txBody>
       </p:sp>
@@ -24696,7 +24670,6 @@
               <a:rPr lang="en-US" dirty="0"/>
               <a:t> API and DSL Design Patterns</a:t>
             </a:r>
-            <a:endParaRPr lang="en-US" dirty="0"/>
           </a:p>
         </p:txBody>
       </p:sp>
@@ -26548,7 +26521,6 @@
               <a:rPr lang="en-US" dirty="0"/>
               <a:t> API and DSL Design Patterns</a:t>
             </a:r>
-            <a:endParaRPr lang="en-US" dirty="0"/>
           </a:p>
         </p:txBody>
       </p:sp>
@@ -26757,7 +26729,6 @@
               <a:rPr lang="en-US" dirty="0"/>
               <a:t> API and DSL Design Patterns</a:t>
             </a:r>
-            <a:endParaRPr lang="en-US" dirty="0"/>
           </a:p>
         </p:txBody>
       </p:sp>
@@ -26975,7 +26946,6 @@
               <a:rPr lang="en-US" dirty="0"/>
               <a:t> API and DSL Design Patterns</a:t>
             </a:r>
-            <a:endParaRPr lang="en-US" dirty="0"/>
           </a:p>
         </p:txBody>
       </p:sp>
@@ -27212,7 +27182,6 @@
               <a:rPr lang="en-US" dirty="0"/>
               <a:t> API and DSL Design Patterns</a:t>
             </a:r>
-            <a:endParaRPr lang="en-US" dirty="0"/>
           </a:p>
         </p:txBody>
       </p:sp>
@@ -27237,6 +27206,239 @@
 </file>
 
 <file path=ppt/slides/slide38.xml><?xml version="1.0" encoding="utf-8"?>
+<p:sld xmlns:a="http://schemas.openxmlformats.org/drawingml/2006/main" xmlns:r="http://schemas.openxmlformats.org/officeDocument/2006/relationships" xmlns:p="http://schemas.openxmlformats.org/presentationml/2006/main">
+  <p:cSld>
+    <p:spTree>
+      <p:nvGrpSpPr>
+        <p:cNvPr id="1" name=""/>
+        <p:cNvGrpSpPr/>
+        <p:nvPr/>
+      </p:nvGrpSpPr>
+      <p:grpSpPr>
+        <a:xfrm>
+          <a:off x="0" y="0"/>
+          <a:ext cx="0" cy="0"/>
+          <a:chOff x="0" y="0"/>
+          <a:chExt cx="0" cy="0"/>
+        </a:xfrm>
+      </p:grpSpPr>
+      <p:sp>
+        <p:nvSpPr>
+          <p:cNvPr id="2" name="Textplatzhalter 1"/>
+          <p:cNvSpPr>
+            <a:spLocks noGrp="1"/>
+          </p:cNvSpPr>
+          <p:nvPr>
+            <p:ph type="body" sz="quarter" idx="10"/>
+          </p:nvPr>
+        </p:nvSpPr>
+        <p:spPr/>
+        <p:txBody>
+          <a:bodyPr/>
+          <a:lstStyle/>
+          <a:p>
+            <a:r>
+              <a:rPr lang="en-US" dirty="0"/>
+              <a:t>Image Sources</a:t>
+            </a:r>
+          </a:p>
+          <a:p>
+            <a:endParaRPr lang="en-US" dirty="0"/>
+          </a:p>
+        </p:txBody>
+      </p:sp>
+      <p:sp>
+        <p:nvSpPr>
+          <p:cNvPr id="3" name="Inhaltsplatzhalter 2"/>
+          <p:cNvSpPr>
+            <a:spLocks noGrp="1"/>
+          </p:cNvSpPr>
+          <p:nvPr>
+            <p:ph sz="quarter" idx="13"/>
+          </p:nvPr>
+        </p:nvSpPr>
+        <p:spPr>
+          <a:xfrm>
+            <a:off x="454194" y="1837637"/>
+            <a:ext cx="8235122" cy="3988027"/>
+          </a:xfrm>
+        </p:spPr>
+        <p:txBody>
+          <a:bodyPr/>
+          <a:lstStyle/>
+          <a:p>
+            <a:endParaRPr lang="de-DE" dirty="0" smtClean="0"/>
+          </a:p>
+          <a:p>
+            <a:endParaRPr lang="de-DE" dirty="0"/>
+          </a:p>
+          <a:p>
+            <a:r>
+              <a:rPr lang="de-DE" dirty="0" smtClean="0"/>
+              <a:t>Max </a:t>
+            </a:r>
+            <a:r>
+              <a:rPr lang="de-DE" dirty="0"/>
+              <a:t>Power:</a:t>
+            </a:r>
+            <a:br>
+              <a:rPr lang="de-DE" dirty="0"/>
+            </a:br>
+            <a:r>
+              <a:rPr lang="de-DE" dirty="0">
+                <a:hlinkClick r:id="rId2"/>
+              </a:rPr>
+              <a:t>http://25.media.tumblr.com/tumblr_lxxowbwXTs1qhkm9yo1_400.gif</a:t>
+            </a:r>
+            <a:endParaRPr lang="en-US" dirty="0"/>
+          </a:p>
+          <a:p>
+            <a:pPr marL="0" indent="0">
+              <a:buNone/>
+            </a:pPr>
+            <a:endParaRPr lang="de-DE" dirty="0"/>
+          </a:p>
+          <a:p>
+            <a:endParaRPr lang="de-DE" dirty="0"/>
+          </a:p>
+          <a:p>
+            <a:r>
+              <a:rPr lang="de-DE" dirty="0" err="1"/>
+              <a:t>Joda</a:t>
+            </a:r>
+            <a:r>
+              <a:rPr lang="de-DE" dirty="0"/>
+              <a:t> </a:t>
+            </a:r>
+            <a:r>
+              <a:rPr lang="de-DE" dirty="0" err="1"/>
+              <a:t>Pug</a:t>
+            </a:r>
+            <a:r>
+              <a:rPr lang="de-DE" dirty="0"/>
+              <a:t>:</a:t>
+            </a:r>
+            <a:br>
+              <a:rPr lang="de-DE" dirty="0"/>
+            </a:br>
+            <a:r>
+              <a:rPr lang="de-DE" dirty="0">
+                <a:hlinkClick r:id="rId3"/>
+              </a:rPr>
+              <a:t>https://unsplash.com/photos/2Ts5HnA67k8</a:t>
+            </a:r>
+            <a:endParaRPr lang="de-DE" dirty="0"/>
+          </a:p>
+          <a:p>
+            <a:endParaRPr lang="en-US" dirty="0"/>
+          </a:p>
+        </p:txBody>
+      </p:sp>
+      <p:sp>
+        <p:nvSpPr>
+          <p:cNvPr id="4" name="Fußzeilenplatzhalter 3"/>
+          <p:cNvSpPr>
+            <a:spLocks noGrp="1"/>
+          </p:cNvSpPr>
+          <p:nvPr>
+            <p:ph type="ftr" sz="quarter" idx="3"/>
+          </p:nvPr>
+        </p:nvSpPr>
+        <p:spPr/>
+        <p:txBody>
+          <a:bodyPr/>
+          <a:lstStyle/>
+          <a:p>
+            <a:r>
+              <a:rPr lang="de-DE" smtClean="0">
+                <a:latin typeface="Arial"/>
+              </a:rPr>
+              <a:t>© Fraunhofer FOKUS</a:t>
+            </a:r>
+            <a:endParaRPr lang="de-DE" dirty="0">
+              <a:latin typeface="Arial"/>
+            </a:endParaRPr>
+          </a:p>
+        </p:txBody>
+      </p:sp>
+      <p:sp>
+        <p:nvSpPr>
+          <p:cNvPr id="5" name="Titel 4"/>
+          <p:cNvSpPr>
+            <a:spLocks noGrp="1"/>
+          </p:cNvSpPr>
+          <p:nvPr>
+            <p:ph type="ctrTitle"/>
+          </p:nvPr>
+        </p:nvSpPr>
+        <p:spPr/>
+        <p:txBody>
+          <a:bodyPr/>
+          <a:lstStyle/>
+          <a:p>
+            <a:r>
+              <a:rPr lang="en-US" dirty="0" err="1"/>
+              <a:t>Xtend</a:t>
+            </a:r>
+            <a:r>
+              <a:rPr lang="en-US" dirty="0"/>
+              <a:t> </a:t>
+            </a:r>
+            <a:r>
+              <a:rPr lang="de-DE" dirty="0"/>
+              <a:t>–</a:t>
+            </a:r>
+            <a:r>
+              <a:rPr lang="en-US" dirty="0"/>
+              <a:t> API and DSL Design Patterns</a:t>
+            </a:r>
+          </a:p>
+        </p:txBody>
+      </p:sp>
+      <p:pic>
+        <p:nvPicPr>
+          <p:cNvPr id="6" name="Grafik 5"/>
+          <p:cNvPicPr>
+            <a:picLocks noChangeAspect="1"/>
+          </p:cNvPicPr>
+          <p:nvPr/>
+        </p:nvPicPr>
+        <p:blipFill>
+          <a:blip r:embed="rId4">
+            <a:extLst>
+              <a:ext uri="{28A0092B-C50C-407E-A947-70E740481C1C}">
+                <a14:useLocalDpi xmlns:a14="http://schemas.microsoft.com/office/drawing/2010/main" val="0"/>
+              </a:ext>
+            </a:extLst>
+          </a:blip>
+          <a:stretch>
+            <a:fillRect/>
+          </a:stretch>
+        </p:blipFill>
+        <p:spPr>
+          <a:xfrm>
+            <a:off x="4959147" y="3639337"/>
+            <a:ext cx="476250" cy="476250"/>
+          </a:xfrm>
+          <a:prstGeom prst="rect">
+            <a:avLst/>
+          </a:prstGeom>
+        </p:spPr>
+      </p:pic>
+    </p:spTree>
+    <p:extLst>
+      <p:ext uri="{BB962C8B-B14F-4D97-AF65-F5344CB8AC3E}">
+        <p14:creationId xmlns:p14="http://schemas.microsoft.com/office/powerpoint/2010/main" val="247265457"/>
+      </p:ext>
+    </p:extLst>
+  </p:cSld>
+  <p:clrMapOvr>
+    <a:masterClrMapping/>
+  </p:clrMapOvr>
+</p:sld>
+</file>
+
+<file path=ppt/slides/slide39.xml><?xml version="1.0" encoding="utf-8"?>
 <p:sld xmlns:a="http://schemas.openxmlformats.org/drawingml/2006/main" xmlns:r="http://schemas.openxmlformats.org/officeDocument/2006/relationships" xmlns:p="http://schemas.openxmlformats.org/presentationml/2006/main" show="0">
   <p:cSld>
     <p:spTree>
@@ -27542,7 +27744,6 @@
               <a:rPr lang="en-US" dirty="0"/>
               <a:t> API and DSL Design Patterns</a:t>
             </a:r>
-            <a:endParaRPr lang="en-US" dirty="0"/>
           </a:p>
         </p:txBody>
       </p:sp>
@@ -27562,228 +27763,6 @@
     </mc:Choice>
     <mc:Fallback xmlns="">
       <p:transition spd="slow"/>
-    </mc:Fallback>
-  </mc:AlternateContent>
-  <p:timing>
-    <p:tnLst>
-      <p:par>
-        <p:cTn id="1" dur="indefinite" restart="never" nodeType="tmRoot"/>
-      </p:par>
-    </p:tnLst>
-  </p:timing>
-</p:sld>
-</file>
-
-<file path=ppt/slides/slide39.xml><?xml version="1.0" encoding="utf-8"?>
-<p:sld xmlns:a="http://schemas.openxmlformats.org/drawingml/2006/main" xmlns:r="http://schemas.openxmlformats.org/officeDocument/2006/relationships" xmlns:p="http://schemas.openxmlformats.org/presentationml/2006/main">
-  <p:cSld>
-    <p:spTree>
-      <p:nvGrpSpPr>
-        <p:cNvPr id="1" name=""/>
-        <p:cNvGrpSpPr/>
-        <p:nvPr/>
-      </p:nvGrpSpPr>
-      <p:grpSpPr>
-        <a:xfrm>
-          <a:off x="0" y="0"/>
-          <a:ext cx="0" cy="0"/>
-          <a:chOff x="0" y="0"/>
-          <a:chExt cx="0" cy="0"/>
-        </a:xfrm>
-      </p:grpSpPr>
-      <p:sp>
-        <p:nvSpPr>
-          <p:cNvPr id="3" name="Fußzeilenplatzhalter 2"/>
-          <p:cNvSpPr>
-            <a:spLocks noGrp="1"/>
-          </p:cNvSpPr>
-          <p:nvPr>
-            <p:ph type="ftr" sz="quarter" idx="3"/>
-          </p:nvPr>
-        </p:nvSpPr>
-        <p:spPr/>
-        <p:txBody>
-          <a:bodyPr/>
-          <a:lstStyle/>
-          <a:p>
-            <a:r>
-              <a:rPr lang="de-DE" dirty="0" smtClean="0">
-                <a:latin typeface="Arial"/>
-              </a:rPr>
-              <a:t>© Fraunhofer FOKUS</a:t>
-            </a:r>
-            <a:endParaRPr lang="de-DE" dirty="0">
-              <a:latin typeface="Arial"/>
-            </a:endParaRPr>
-          </a:p>
-        </p:txBody>
-      </p:sp>
-      <p:sp>
-        <p:nvSpPr>
-          <p:cNvPr id="4" name="Inhaltsplatzhalter 3"/>
-          <p:cNvSpPr>
-            <a:spLocks noGrp="1"/>
-          </p:cNvSpPr>
-          <p:nvPr>
-            <p:ph type="body" sz="quarter" idx="10"/>
-          </p:nvPr>
-        </p:nvSpPr>
-        <p:spPr>
-          <a:xfrm>
-            <a:off x="457589" y="1875935"/>
-            <a:ext cx="8232775" cy="3639942"/>
-          </a:xfrm>
-        </p:spPr>
-        <p:txBody>
-          <a:bodyPr/>
-          <a:lstStyle/>
-          <a:p>
-            <a:pPr>
-              <a:lnSpc>
-                <a:spcPts val="2120"/>
-              </a:lnSpc>
-              <a:spcBef>
-                <a:spcPts val="432"/>
-              </a:spcBef>
-              <a:buClr>
-                <a:schemeClr val="tx1"/>
-              </a:buClr>
-            </a:pPr>
-            <a:r>
-              <a:rPr lang="de-DE" dirty="0" smtClean="0"/>
-              <a:t>Fraunhofer FOKUS</a:t>
-            </a:r>
-            <a:r>
-              <a:rPr lang="de-DE" dirty="0"/>
-              <a:t/>
-            </a:r>
-            <a:br>
-              <a:rPr lang="de-DE" dirty="0"/>
-            </a:br>
-            <a:r>
-              <a:rPr lang="de-DE" dirty="0"/>
-              <a:t>Kaiserin-Augusta-Allee 31</a:t>
-            </a:r>
-            <a:br>
-              <a:rPr lang="de-DE" dirty="0"/>
-            </a:br>
-            <a:r>
-              <a:rPr lang="de-DE" dirty="0"/>
-              <a:t>10589 Berlin, Germany</a:t>
-            </a:r>
-          </a:p>
-          <a:p>
-            <a:pPr>
-              <a:lnSpc>
-                <a:spcPts val="2120"/>
-              </a:lnSpc>
-              <a:spcBef>
-                <a:spcPts val="432"/>
-              </a:spcBef>
-              <a:buClr>
-                <a:schemeClr val="tx1"/>
-              </a:buClr>
-            </a:pPr>
-            <a:r>
-              <a:rPr lang="de-DE" dirty="0"/>
-              <a:t>www.fokus.fraunhofer.de</a:t>
-            </a:r>
-          </a:p>
-          <a:p>
-            <a:pPr>
-              <a:lnSpc>
-                <a:spcPts val="2120"/>
-              </a:lnSpc>
-              <a:spcBef>
-                <a:spcPts val="432"/>
-              </a:spcBef>
-              <a:buClr>
-                <a:schemeClr val="tx1"/>
-              </a:buClr>
-            </a:pPr>
-            <a:endParaRPr lang="de-DE" dirty="0"/>
-          </a:p>
-          <a:p>
-            <a:r>
-              <a:rPr lang="de-DE" dirty="0" smtClean="0"/>
-              <a:t>Max Bureck</a:t>
-            </a:r>
-          </a:p>
-          <a:p>
-            <a:r>
-              <a:rPr lang="de-DE" dirty="0" smtClean="0"/>
-              <a:t>Senior Researcher</a:t>
-            </a:r>
-          </a:p>
-          <a:p>
-            <a:r>
-              <a:rPr lang="de-DE" dirty="0" smtClean="0"/>
-              <a:t>max.bureck@fokus.fraunhofer.de</a:t>
-            </a:r>
-          </a:p>
-          <a:p>
-            <a:r>
-              <a:rPr lang="de-DE" dirty="0" smtClean="0"/>
-              <a:t>Phone </a:t>
-            </a:r>
-            <a:r>
-              <a:rPr lang="de-DE" dirty="0"/>
-              <a:t>+49 (0)30 </a:t>
-            </a:r>
-            <a:r>
-              <a:rPr lang="de-DE" dirty="0" smtClean="0"/>
-              <a:t>3463-7321</a:t>
-            </a:r>
-            <a:endParaRPr lang="de-DE" b="1" dirty="0">
-              <a:solidFill>
-                <a:srgbClr val="FF0000"/>
-              </a:solidFill>
-            </a:endParaRPr>
-          </a:p>
-          <a:p>
-            <a:endParaRPr lang="de-DE" dirty="0"/>
-          </a:p>
-        </p:txBody>
-      </p:sp>
-      <p:sp>
-        <p:nvSpPr>
-          <p:cNvPr id="5" name="Titel 4"/>
-          <p:cNvSpPr>
-            <a:spLocks noGrp="1"/>
-          </p:cNvSpPr>
-          <p:nvPr>
-            <p:ph type="ctrTitle"/>
-          </p:nvPr>
-        </p:nvSpPr>
-        <p:spPr/>
-        <p:txBody>
-          <a:bodyPr/>
-          <a:lstStyle/>
-          <a:p>
-            <a:r>
-              <a:rPr lang="de-DE" dirty="0" err="1" smtClean="0"/>
-              <a:t>Contact</a:t>
-            </a:r>
-            <a:endParaRPr lang="de-DE" dirty="0"/>
-          </a:p>
-        </p:txBody>
-      </p:sp>
-    </p:spTree>
-    <p:extLst>
-      <p:ext uri="{BB962C8B-B14F-4D97-AF65-F5344CB8AC3E}">
-        <p14:creationId xmlns:p14="http://schemas.microsoft.com/office/powerpoint/2010/main" val="2050665020"/>
-      </p:ext>
-    </p:extLst>
-  </p:cSld>
-  <p:clrMapOvr>
-    <a:masterClrMapping/>
-  </p:clrMapOvr>
-  <mc:AlternateContent xmlns:mc="http://schemas.openxmlformats.org/markup-compatibility/2006" xmlns:p14="http://schemas.microsoft.com/office/powerpoint/2010/main">
-    <mc:Choice Requires="p14">
-      <p:transition spd="slow" p14:dur="2000"/>
-    </mc:Choice>
-    <mc:Fallback xmlns="">
-      <p:transition xmlns:p14="http://schemas.microsoft.com/office/powerpoint/2010/main" spd="slow"/>
     </mc:Fallback>
   </mc:AlternateContent>
   <p:timing>
@@ -27844,7 +27823,6 @@
               <a:rPr lang="en-US" dirty="0"/>
               <a:t> API and DSL Design Patterns</a:t>
             </a:r>
-            <a:endParaRPr lang="en-US" dirty="0"/>
           </a:p>
         </p:txBody>
       </p:sp>
@@ -29106,6 +29084,228 @@
 </p:sld>
 </file>
 
+<file path=ppt/slides/slide40.xml><?xml version="1.0" encoding="utf-8"?>
+<p:sld xmlns:a="http://schemas.openxmlformats.org/drawingml/2006/main" xmlns:r="http://schemas.openxmlformats.org/officeDocument/2006/relationships" xmlns:p="http://schemas.openxmlformats.org/presentationml/2006/main">
+  <p:cSld>
+    <p:spTree>
+      <p:nvGrpSpPr>
+        <p:cNvPr id="1" name=""/>
+        <p:cNvGrpSpPr/>
+        <p:nvPr/>
+      </p:nvGrpSpPr>
+      <p:grpSpPr>
+        <a:xfrm>
+          <a:off x="0" y="0"/>
+          <a:ext cx="0" cy="0"/>
+          <a:chOff x="0" y="0"/>
+          <a:chExt cx="0" cy="0"/>
+        </a:xfrm>
+      </p:grpSpPr>
+      <p:sp>
+        <p:nvSpPr>
+          <p:cNvPr id="3" name="Fußzeilenplatzhalter 2"/>
+          <p:cNvSpPr>
+            <a:spLocks noGrp="1"/>
+          </p:cNvSpPr>
+          <p:nvPr>
+            <p:ph type="ftr" sz="quarter" idx="3"/>
+          </p:nvPr>
+        </p:nvSpPr>
+        <p:spPr/>
+        <p:txBody>
+          <a:bodyPr/>
+          <a:lstStyle/>
+          <a:p>
+            <a:r>
+              <a:rPr lang="de-DE" dirty="0" smtClean="0">
+                <a:latin typeface="Arial"/>
+              </a:rPr>
+              <a:t>© Fraunhofer FOKUS</a:t>
+            </a:r>
+            <a:endParaRPr lang="de-DE" dirty="0">
+              <a:latin typeface="Arial"/>
+            </a:endParaRPr>
+          </a:p>
+        </p:txBody>
+      </p:sp>
+      <p:sp>
+        <p:nvSpPr>
+          <p:cNvPr id="4" name="Inhaltsplatzhalter 3"/>
+          <p:cNvSpPr>
+            <a:spLocks noGrp="1"/>
+          </p:cNvSpPr>
+          <p:nvPr>
+            <p:ph type="body" sz="quarter" idx="10"/>
+          </p:nvPr>
+        </p:nvSpPr>
+        <p:spPr>
+          <a:xfrm>
+            <a:off x="457589" y="1875935"/>
+            <a:ext cx="8232775" cy="3639942"/>
+          </a:xfrm>
+        </p:spPr>
+        <p:txBody>
+          <a:bodyPr/>
+          <a:lstStyle/>
+          <a:p>
+            <a:pPr>
+              <a:lnSpc>
+                <a:spcPts val="2120"/>
+              </a:lnSpc>
+              <a:spcBef>
+                <a:spcPts val="432"/>
+              </a:spcBef>
+              <a:buClr>
+                <a:schemeClr val="tx1"/>
+              </a:buClr>
+            </a:pPr>
+            <a:r>
+              <a:rPr lang="de-DE" dirty="0" smtClean="0"/>
+              <a:t>Fraunhofer FOKUS</a:t>
+            </a:r>
+            <a:r>
+              <a:rPr lang="de-DE" dirty="0"/>
+              <a:t/>
+            </a:r>
+            <a:br>
+              <a:rPr lang="de-DE" dirty="0"/>
+            </a:br>
+            <a:r>
+              <a:rPr lang="de-DE" dirty="0"/>
+              <a:t>Kaiserin-Augusta-Allee 31</a:t>
+            </a:r>
+            <a:br>
+              <a:rPr lang="de-DE" dirty="0"/>
+            </a:br>
+            <a:r>
+              <a:rPr lang="de-DE" dirty="0"/>
+              <a:t>10589 Berlin, Germany</a:t>
+            </a:r>
+          </a:p>
+          <a:p>
+            <a:pPr>
+              <a:lnSpc>
+                <a:spcPts val="2120"/>
+              </a:lnSpc>
+              <a:spcBef>
+                <a:spcPts val="432"/>
+              </a:spcBef>
+              <a:buClr>
+                <a:schemeClr val="tx1"/>
+              </a:buClr>
+            </a:pPr>
+            <a:r>
+              <a:rPr lang="de-DE" dirty="0"/>
+              <a:t>www.fokus.fraunhofer.de</a:t>
+            </a:r>
+          </a:p>
+          <a:p>
+            <a:pPr>
+              <a:lnSpc>
+                <a:spcPts val="2120"/>
+              </a:lnSpc>
+              <a:spcBef>
+                <a:spcPts val="432"/>
+              </a:spcBef>
+              <a:buClr>
+                <a:schemeClr val="tx1"/>
+              </a:buClr>
+            </a:pPr>
+            <a:endParaRPr lang="de-DE" dirty="0"/>
+          </a:p>
+          <a:p>
+            <a:r>
+              <a:rPr lang="de-DE" dirty="0" smtClean="0"/>
+              <a:t>Max Bureck</a:t>
+            </a:r>
+          </a:p>
+          <a:p>
+            <a:r>
+              <a:rPr lang="de-DE" dirty="0" smtClean="0"/>
+              <a:t>Senior Researcher</a:t>
+            </a:r>
+          </a:p>
+          <a:p>
+            <a:r>
+              <a:rPr lang="de-DE" dirty="0" smtClean="0"/>
+              <a:t>max.bureck@fokus.fraunhofer.de</a:t>
+            </a:r>
+          </a:p>
+          <a:p>
+            <a:r>
+              <a:rPr lang="de-DE" dirty="0" smtClean="0"/>
+              <a:t>Phone </a:t>
+            </a:r>
+            <a:r>
+              <a:rPr lang="de-DE" dirty="0"/>
+              <a:t>+49 (0)30 </a:t>
+            </a:r>
+            <a:r>
+              <a:rPr lang="de-DE" dirty="0" smtClean="0"/>
+              <a:t>3463-7321</a:t>
+            </a:r>
+            <a:endParaRPr lang="de-DE" b="1" dirty="0">
+              <a:solidFill>
+                <a:srgbClr val="FF0000"/>
+              </a:solidFill>
+            </a:endParaRPr>
+          </a:p>
+          <a:p>
+            <a:endParaRPr lang="de-DE" dirty="0"/>
+          </a:p>
+        </p:txBody>
+      </p:sp>
+      <p:sp>
+        <p:nvSpPr>
+          <p:cNvPr id="5" name="Titel 4"/>
+          <p:cNvSpPr>
+            <a:spLocks noGrp="1"/>
+          </p:cNvSpPr>
+          <p:nvPr>
+            <p:ph type="ctrTitle"/>
+          </p:nvPr>
+        </p:nvSpPr>
+        <p:spPr/>
+        <p:txBody>
+          <a:bodyPr/>
+          <a:lstStyle/>
+          <a:p>
+            <a:r>
+              <a:rPr lang="de-DE" dirty="0" err="1" smtClean="0"/>
+              <a:t>Contact</a:t>
+            </a:r>
+            <a:endParaRPr lang="de-DE" dirty="0"/>
+          </a:p>
+        </p:txBody>
+      </p:sp>
+    </p:spTree>
+    <p:extLst>
+      <p:ext uri="{BB962C8B-B14F-4D97-AF65-F5344CB8AC3E}">
+        <p14:creationId xmlns:p14="http://schemas.microsoft.com/office/powerpoint/2010/main" val="2050665020"/>
+      </p:ext>
+    </p:extLst>
+  </p:cSld>
+  <p:clrMapOvr>
+    <a:masterClrMapping/>
+  </p:clrMapOvr>
+  <mc:AlternateContent xmlns:mc="http://schemas.openxmlformats.org/markup-compatibility/2006" xmlns:p14="http://schemas.microsoft.com/office/powerpoint/2010/main">
+    <mc:Choice Requires="p14">
+      <p:transition spd="slow" p14:dur="2000"/>
+    </mc:Choice>
+    <mc:Fallback xmlns="">
+      <p:transition xmlns:p14="http://schemas.microsoft.com/office/powerpoint/2010/main" spd="slow"/>
+    </mc:Fallback>
+  </mc:AlternateContent>
+  <p:timing>
+    <p:tnLst>
+      <p:par>
+        <p:cTn id="1" dur="indefinite" restart="never" nodeType="tmRoot"/>
+      </p:par>
+    </p:tnLst>
+  </p:timing>
+</p:sld>
+</file>
+
 <file path=ppt/slides/slide5.xml><?xml version="1.0" encoding="utf-8"?>
 <p:sld xmlns:a="http://schemas.openxmlformats.org/drawingml/2006/main" xmlns:r="http://schemas.openxmlformats.org/officeDocument/2006/relationships" xmlns:p="http://schemas.openxmlformats.org/presentationml/2006/main">
   <p:cSld>
@@ -29154,7 +29354,6 @@
               <a:rPr lang="en-US" dirty="0"/>
               <a:t> API and DSL Design Patterns</a:t>
             </a:r>
-            <a:endParaRPr lang="en-US" dirty="0"/>
           </a:p>
         </p:txBody>
       </p:sp>
@@ -32458,7 +32657,6 @@
               <a:rPr lang="en-US" dirty="0"/>
               <a:t> API and DSL Design Patterns</a:t>
             </a:r>
-            <a:endParaRPr lang="en-US" dirty="0"/>
           </a:p>
         </p:txBody>
       </p:sp>

</xml_diff>

<commit_message>
Large restructuring, added documents
</commit_message>
<xml_diff>
--- a/docs/Xtend_API_and_DSL_Design_Patterns_EclipseConFrance2016.pptx
+++ b/docs/Xtend_API_and_DSL_Design_Patterns_EclipseConFrance2016.pptx
@@ -5,7 +5,7 @@
     <p:sldMasterId id="2147483790" r:id="rId1"/>
   </p:sldMasterIdLst>
   <p:notesMasterIdLst>
-    <p:notesMasterId r:id="rId42"/>
+    <p:notesMasterId r:id="rId43"/>
   </p:notesMasterIdLst>
   <p:sldIdLst>
     <p:sldId id="257" r:id="rId2"/>
@@ -44,10 +44,11 @@
     <p:sldId id="322" r:id="rId35"/>
     <p:sldId id="314" r:id="rId36"/>
     <p:sldId id="327" r:id="rId37"/>
-    <p:sldId id="301" r:id="rId38"/>
-    <p:sldId id="340" r:id="rId39"/>
-    <p:sldId id="304" r:id="rId40"/>
-    <p:sldId id="267" r:id="rId41"/>
+    <p:sldId id="341" r:id="rId38"/>
+    <p:sldId id="301" r:id="rId39"/>
+    <p:sldId id="340" r:id="rId40"/>
+    <p:sldId id="304" r:id="rId41"/>
+    <p:sldId id="267" r:id="rId42"/>
   </p:sldIdLst>
   <p:sldSz cx="9144000" cy="6858000" type="screen4x3"/>
   <p:notesSz cx="6858000" cy="9144000"/>
@@ -259,7 +260,7 @@
           <a:p>
             <a:fld id="{9E2B4FE6-1CE3-304D-A5AE-188A738F9CD6}" type="datetimeFigureOut">
               <a:rPr lang="de-DE" smtClean="0"/>
-              <a:t>06.06.2016</a:t>
+              <a:t>05.04.2017</a:t>
             </a:fld>
             <a:endParaRPr lang="de-DE" dirty="0"/>
           </a:p>
@@ -4063,12 +4064,7 @@
             <p:ph type="sldImg"/>
           </p:nvPr>
         </p:nvSpPr>
-        <p:spPr>
-          <a:xfrm>
-            <a:off x="1143000" y="685800"/>
-            <a:ext cx="4572000" cy="3429000"/>
-          </a:xfrm>
-        </p:spPr>
+        <p:spPr/>
       </p:sp>
       <p:sp>
         <p:nvSpPr>
@@ -4087,7 +4083,7 @@
           <a:p>
             <a:r>
               <a:rPr lang="de-DE" dirty="0" err="1" smtClean="0"/>
-              <a:t>Builder</a:t>
+              <a:t>Context</a:t>
             </a:r>
             <a:r>
               <a:rPr lang="de-DE" dirty="0" smtClean="0"/>
@@ -4095,23 +4091,19 @@
             </a:r>
             <a:r>
               <a:rPr lang="de-DE" dirty="0" err="1" smtClean="0"/>
-              <a:t>is</a:t>
+              <a:t>first</a:t>
             </a:r>
             <a:r>
               <a:rPr lang="de-DE" dirty="0" smtClean="0"/>
-              <a:t> </a:t>
+              <a:t>, </a:t>
             </a:r>
             <a:r>
               <a:rPr lang="de-DE" dirty="0" err="1" smtClean="0"/>
-              <a:t>the</a:t>
+              <a:t>lambda</a:t>
             </a:r>
             <a:r>
               <a:rPr lang="de-DE" dirty="0" smtClean="0"/>
-              <a:t> </a:t>
-            </a:r>
-            <a:r>
-              <a:rPr lang="de-DE" dirty="0" err="1" smtClean="0"/>
-              <a:t>answer</a:t>
+              <a:t> last</a:t>
             </a:r>
             <a:endParaRPr lang="en-US" dirty="0"/>
           </a:p>
@@ -4134,7 +4126,7 @@
           <a:p>
             <a:fld id="{913296C2-530A-6D45-BF6A-B25DBE574084}" type="slidenum">
               <a:rPr lang="de-DE" smtClean="0"/>
-              <a:t>30</a:t>
+              <a:t>29</a:t>
             </a:fld>
             <a:endParaRPr lang="de-DE" dirty="0"/>
           </a:p>
@@ -4143,7 +4135,7 @@
     </p:spTree>
     <p:extLst>
       <p:ext uri="{BB962C8B-B14F-4D97-AF65-F5344CB8AC3E}">
-        <p14:creationId xmlns:p14="http://schemas.microsoft.com/office/powerpoint/2010/main" val="2426729544"/>
+        <p14:creationId xmlns:p14="http://schemas.microsoft.com/office/powerpoint/2010/main" val="1726905464"/>
       </p:ext>
     </p:extLst>
   </p:cSld>
@@ -4202,6 +4194,34 @@
           <a:bodyPr/>
           <a:lstStyle/>
           <a:p>
+            <a:r>
+              <a:rPr lang="de-DE" dirty="0" err="1" smtClean="0"/>
+              <a:t>Builder</a:t>
+            </a:r>
+            <a:r>
+              <a:rPr lang="de-DE" dirty="0" smtClean="0"/>
+              <a:t> </a:t>
+            </a:r>
+            <a:r>
+              <a:rPr lang="de-DE" dirty="0" err="1" smtClean="0"/>
+              <a:t>is</a:t>
+            </a:r>
+            <a:r>
+              <a:rPr lang="de-DE" dirty="0" smtClean="0"/>
+              <a:t> </a:t>
+            </a:r>
+            <a:r>
+              <a:rPr lang="de-DE" dirty="0" err="1" smtClean="0"/>
+              <a:t>the</a:t>
+            </a:r>
+            <a:r>
+              <a:rPr lang="de-DE" dirty="0" smtClean="0"/>
+              <a:t> </a:t>
+            </a:r>
+            <a:r>
+              <a:rPr lang="de-DE" dirty="0" err="1" smtClean="0"/>
+              <a:t>answer</a:t>
+            </a:r>
             <a:endParaRPr lang="en-US" dirty="0"/>
           </a:p>
         </p:txBody>
@@ -4223,6 +4243,95 @@
           <a:p>
             <a:fld id="{913296C2-530A-6D45-BF6A-B25DBE574084}" type="slidenum">
               <a:rPr lang="de-DE" smtClean="0"/>
+              <a:t>30</a:t>
+            </a:fld>
+            <a:endParaRPr lang="de-DE" dirty="0"/>
+          </a:p>
+        </p:txBody>
+      </p:sp>
+    </p:spTree>
+    <p:extLst>
+      <p:ext uri="{BB962C8B-B14F-4D97-AF65-F5344CB8AC3E}">
+        <p14:creationId xmlns:p14="http://schemas.microsoft.com/office/powerpoint/2010/main" val="2426729544"/>
+      </p:ext>
+    </p:extLst>
+  </p:cSld>
+  <p:clrMapOvr>
+    <a:masterClrMapping/>
+  </p:clrMapOvr>
+</p:notes>
+</file>
+
+<file path=ppt/notesSlides/notesSlide26.xml><?xml version="1.0" encoding="utf-8"?>
+<p:notes xmlns:a="http://schemas.openxmlformats.org/drawingml/2006/main" xmlns:r="http://schemas.openxmlformats.org/officeDocument/2006/relationships" xmlns:p="http://schemas.openxmlformats.org/presentationml/2006/main">
+  <p:cSld>
+    <p:spTree>
+      <p:nvGrpSpPr>
+        <p:cNvPr id="1" name=""/>
+        <p:cNvGrpSpPr/>
+        <p:nvPr/>
+      </p:nvGrpSpPr>
+      <p:grpSpPr>
+        <a:xfrm>
+          <a:off x="0" y="0"/>
+          <a:ext cx="0" cy="0"/>
+          <a:chOff x="0" y="0"/>
+          <a:chExt cx="0" cy="0"/>
+        </a:xfrm>
+      </p:grpSpPr>
+      <p:sp>
+        <p:nvSpPr>
+          <p:cNvPr id="2" name="Folienbildplatzhalter 1"/>
+          <p:cNvSpPr>
+            <a:spLocks noGrp="1" noRot="1" noChangeAspect="1"/>
+          </p:cNvSpPr>
+          <p:nvPr>
+            <p:ph type="sldImg"/>
+          </p:nvPr>
+        </p:nvSpPr>
+        <p:spPr>
+          <a:xfrm>
+            <a:off x="1143000" y="685800"/>
+            <a:ext cx="4572000" cy="3429000"/>
+          </a:xfrm>
+        </p:spPr>
+      </p:sp>
+      <p:sp>
+        <p:nvSpPr>
+          <p:cNvPr id="3" name="Notizenplatzhalter 2"/>
+          <p:cNvSpPr>
+            <a:spLocks noGrp="1"/>
+          </p:cNvSpPr>
+          <p:nvPr>
+            <p:ph type="body" idx="1"/>
+          </p:nvPr>
+        </p:nvSpPr>
+        <p:spPr/>
+        <p:txBody>
+          <a:bodyPr/>
+          <a:lstStyle/>
+          <a:p>
+            <a:endParaRPr lang="en-US" dirty="0"/>
+          </a:p>
+        </p:txBody>
+      </p:sp>
+      <p:sp>
+        <p:nvSpPr>
+          <p:cNvPr id="4" name="Foliennummernplatzhalter 3"/>
+          <p:cNvSpPr>
+            <a:spLocks noGrp="1"/>
+          </p:cNvSpPr>
+          <p:nvPr>
+            <p:ph type="sldNum" sz="quarter" idx="10"/>
+          </p:nvPr>
+        </p:nvSpPr>
+        <p:spPr/>
+        <p:txBody>
+          <a:bodyPr/>
+          <a:lstStyle/>
+          <a:p>
+            <a:fld id="{913296C2-530A-6D45-BF6A-B25DBE574084}" type="slidenum">
+              <a:rPr lang="de-DE" smtClean="0"/>
               <a:t>32</a:t>
             </a:fld>
             <a:endParaRPr lang="de-DE" dirty="0"/>
@@ -4242,7 +4351,7 @@
 </p:notes>
 </file>
 
-<file path=ppt/notesSlides/notesSlide26.xml><?xml version="1.0" encoding="utf-8"?>
+<file path=ppt/notesSlides/notesSlide27.xml><?xml version="1.0" encoding="utf-8"?>
 <p:notes xmlns:a="http://schemas.openxmlformats.org/drawingml/2006/main" xmlns:r="http://schemas.openxmlformats.org/officeDocument/2006/relationships" xmlns:p="http://schemas.openxmlformats.org/presentationml/2006/main">
   <p:cSld>
     <p:spTree>
@@ -9706,7 +9815,7 @@
           <a:p>
             <a:r>
               <a:rPr lang="de-DE" dirty="0" smtClean="0"/>
-              <a:t>Max Bureck, 23. March 2016</a:t>
+              <a:t>Max Bureck, 08. June 2016</a:t>
             </a:r>
             <a:endParaRPr lang="de-DE" dirty="0"/>
           </a:p>
@@ -16502,36 +16611,33 @@
               </a:buClr>
             </a:pPr>
             <a:r>
-              <a:rPr lang="en-US" sz="7200" dirty="0">
+              <a:rPr lang="en-US" sz="7200" dirty="0" smtClean="0">
                 <a:solidFill>
                   <a:schemeClr val="bg1">
                     <a:lumMod val="65000"/>
                   </a:schemeClr>
                 </a:solidFill>
-              </a:rPr>
-              <a:t>🔨</a:t>
-            </a:r>
-            <a:r>
-              <a:rPr lang="en-US" sz="7200" dirty="0">
+                <a:sym typeface="Symbol" panose="05050102010706020507" pitchFamily="18" charset="2"/>
+              </a:rPr>
+              <a:t></a:t>
+            </a:r>
+            <a:r>
+              <a:rPr lang="en-US" sz="7200" dirty="0" smtClean="0">
                 <a:solidFill>
                   <a:schemeClr val="bg1">
                     <a:lumMod val="65000"/>
                   </a:schemeClr>
                 </a:solidFill>
-                <a:sym typeface="Symbol" panose="05050102010706020507" pitchFamily="18" charset="2"/>
-              </a:rPr>
-              <a:t></a:t>
-            </a:r>
-            <a:r>
-              <a:rPr lang="en-US" sz="7200" dirty="0">
-                <a:solidFill>
-                  <a:schemeClr val="bg1">
-                    <a:lumMod val="65000"/>
-                  </a:schemeClr>
-                </a:solidFill>
-              </a:rPr>
-              <a:t> </a:t>
-            </a:r>
+              </a:rPr>
+              <a:t>🔨 </a:t>
+            </a:r>
+            <a:endParaRPr lang="en-US" sz="7200" dirty="0">
+              <a:solidFill>
+                <a:schemeClr val="bg1">
+                  <a:lumMod val="65000"/>
+                </a:schemeClr>
+              </a:solidFill>
+            </a:endParaRPr>
           </a:p>
         </p:txBody>
       </p:sp>
@@ -22992,7 +23098,7 @@
             <p:nvPr/>
           </p:nvPicPr>
           <p:blipFill>
-            <a:blip r:embed="rId2">
+            <a:blip r:embed="rId3">
               <a:extLst>
                 <a:ext uri="{28A0092B-C50C-407E-A947-70E740481C1C}">
                   <a14:useLocalDpi xmlns:a14="http://schemas.microsoft.com/office/drawing/2010/main" val="0"/>
@@ -26203,36 +26309,33 @@
               </a:buClr>
             </a:pPr>
             <a:r>
-              <a:rPr lang="en-US" sz="7200" dirty="0">
+              <a:rPr lang="en-US" sz="7200" dirty="0" smtClean="0">
                 <a:solidFill>
                   <a:schemeClr val="bg1">
                     <a:lumMod val="65000"/>
                   </a:schemeClr>
                 </a:solidFill>
-              </a:rPr>
-              <a:t>🔨</a:t>
-            </a:r>
-            <a:r>
-              <a:rPr lang="en-US" sz="7200" dirty="0">
+                <a:sym typeface="Symbol" panose="05050102010706020507" pitchFamily="18" charset="2"/>
+              </a:rPr>
+              <a:t></a:t>
+            </a:r>
+            <a:r>
+              <a:rPr lang="en-US" sz="7200" dirty="0" smtClean="0">
                 <a:solidFill>
                   <a:schemeClr val="bg1">
                     <a:lumMod val="65000"/>
                   </a:schemeClr>
                 </a:solidFill>
-                <a:sym typeface="Symbol" panose="05050102010706020507" pitchFamily="18" charset="2"/>
-              </a:rPr>
-              <a:t></a:t>
-            </a:r>
-            <a:r>
-              <a:rPr lang="en-US" sz="7200" dirty="0">
-                <a:solidFill>
-                  <a:schemeClr val="bg1">
-                    <a:lumMod val="65000"/>
-                  </a:schemeClr>
-                </a:solidFill>
-              </a:rPr>
-              <a:t> </a:t>
-            </a:r>
+              </a:rPr>
+              <a:t>🔨 </a:t>
+            </a:r>
+            <a:endParaRPr lang="en-US" sz="7200" dirty="0">
+              <a:solidFill>
+                <a:schemeClr val="bg1">
+                  <a:lumMod val="65000"/>
+                </a:schemeClr>
+              </a:solidFill>
+            </a:endParaRPr>
           </a:p>
         </p:txBody>
       </p:sp>
@@ -26988,144 +27091,6 @@
       </p:grpSpPr>
       <p:sp>
         <p:nvSpPr>
-          <p:cNvPr id="2" name="Textplatzhalter 1"/>
-          <p:cNvSpPr>
-            <a:spLocks noGrp="1"/>
-          </p:cNvSpPr>
-          <p:nvPr>
-            <p:ph type="body" sz="quarter" idx="10"/>
-          </p:nvPr>
-        </p:nvSpPr>
-        <p:spPr/>
-        <p:txBody>
-          <a:bodyPr/>
-          <a:lstStyle/>
-          <a:p>
-            <a:r>
-              <a:rPr lang="en-US" dirty="0" smtClean="0"/>
-              <a:t>Feedback and Opinions?</a:t>
-            </a:r>
-            <a:endParaRPr lang="en-US" dirty="0"/>
-          </a:p>
-        </p:txBody>
-      </p:sp>
-      <p:sp>
-        <p:nvSpPr>
-          <p:cNvPr id="3" name="Inhaltsplatzhalter 2"/>
-          <p:cNvSpPr>
-            <a:spLocks noGrp="1"/>
-          </p:cNvSpPr>
-          <p:nvPr>
-            <p:ph sz="quarter" idx="13"/>
-          </p:nvPr>
-        </p:nvSpPr>
-        <p:spPr>
-          <a:xfrm>
-            <a:off x="454195" y="1837639"/>
-            <a:ext cx="8235263" cy="3988027"/>
-          </a:xfrm>
-        </p:spPr>
-        <p:txBody>
-          <a:bodyPr/>
-          <a:lstStyle/>
-          <a:p>
-            <a:r>
-              <a:rPr lang="de-DE" dirty="0" err="1" smtClean="0"/>
-              <a:t>Examples</a:t>
-            </a:r>
-            <a:r>
-              <a:rPr lang="de-DE" dirty="0" smtClean="0"/>
-              <a:t> </a:t>
-            </a:r>
-            <a:r>
-              <a:rPr lang="de-DE" dirty="0" err="1" smtClean="0"/>
-              <a:t>repository</a:t>
-            </a:r>
-            <a:r>
-              <a:rPr lang="de-DE" dirty="0"/>
-              <a:t>: </a:t>
-            </a:r>
-            <a:r>
-              <a:rPr lang="de-DE" dirty="0" smtClean="0"/>
-              <a:t/>
-            </a:r>
-            <a:br>
-              <a:rPr lang="de-DE" dirty="0" smtClean="0"/>
-            </a:br>
-            <a:r>
-              <a:rPr lang="de-DE" dirty="0" smtClean="0">
-                <a:hlinkClick r:id="rId2"/>
-              </a:rPr>
-              <a:t>https</a:t>
-            </a:r>
-            <a:r>
-              <a:rPr lang="de-DE" dirty="0">
-                <a:hlinkClick r:id="rId2"/>
-              </a:rPr>
-              <a:t>://</a:t>
-            </a:r>
-            <a:r>
-              <a:rPr lang="de-DE" dirty="0" smtClean="0">
-                <a:hlinkClick r:id="rId2"/>
-              </a:rPr>
-              <a:t>gitlab.fokus.fraunhofer.de/xtenders/xtend-patterns-presentation.git</a:t>
-            </a:r>
-            <a:r>
-              <a:rPr lang="de-DE" dirty="0" smtClean="0"/>
-              <a:t> </a:t>
-            </a:r>
-            <a:endParaRPr lang="en-US" dirty="0" smtClean="0"/>
-          </a:p>
-          <a:p>
-            <a:endParaRPr lang="en-US" dirty="0"/>
-          </a:p>
-          <a:p>
-            <a:r>
-              <a:rPr lang="en-US" dirty="0" smtClean="0"/>
-              <a:t>Useful?</a:t>
-            </a:r>
-          </a:p>
-          <a:p>
-            <a:endParaRPr lang="en-US" dirty="0" smtClean="0"/>
-          </a:p>
-          <a:p>
-            <a:r>
-              <a:rPr lang="en-US" dirty="0" smtClean="0"/>
-              <a:t>Interesting?</a:t>
-            </a:r>
-          </a:p>
-          <a:p>
-            <a:endParaRPr lang="en-US" dirty="0" smtClean="0"/>
-          </a:p>
-          <a:p>
-            <a:r>
-              <a:rPr lang="en-US" dirty="0" smtClean="0"/>
-              <a:t>Impractical?</a:t>
-            </a:r>
-          </a:p>
-          <a:p>
-            <a:endParaRPr lang="en-US" dirty="0" smtClean="0"/>
-          </a:p>
-          <a:p>
-            <a:r>
-              <a:rPr lang="en-US" dirty="0" smtClean="0"/>
-              <a:t>Too obvious?</a:t>
-            </a:r>
-          </a:p>
-          <a:p>
-            <a:endParaRPr lang="en-US" dirty="0" smtClean="0"/>
-          </a:p>
-          <a:p>
-            <a:r>
-              <a:rPr lang="en-US" dirty="0" smtClean="0"/>
-              <a:t>What are your favorite patterns?</a:t>
-            </a:r>
-            <a:endParaRPr lang="en-US" dirty="0"/>
-          </a:p>
-        </p:txBody>
-      </p:sp>
-      <p:sp>
-        <p:nvSpPr>
           <p:cNvPr id="4" name="Fußzeilenplatzhalter 3"/>
           <p:cNvSpPr>
             <a:spLocks noGrp="1"/>
@@ -27151,44 +27116,34 @@
           </a:p>
         </p:txBody>
       </p:sp>
-      <p:sp>
-        <p:nvSpPr>
-          <p:cNvPr id="5" name="Titel 4"/>
-          <p:cNvSpPr>
-            <a:spLocks noGrp="1"/>
-          </p:cNvSpPr>
-          <p:nvPr>
-            <p:ph type="ctrTitle"/>
-          </p:nvPr>
-        </p:nvSpPr>
-        <p:spPr/>
-        <p:txBody>
-          <a:bodyPr/>
-          <a:lstStyle/>
-          <a:p>
-            <a:r>
-              <a:rPr lang="en-US" dirty="0" err="1"/>
-              <a:t>Xtend</a:t>
-            </a:r>
-            <a:r>
-              <a:rPr lang="en-US" dirty="0"/>
-              <a:t> </a:t>
-            </a:r>
-            <a:r>
-              <a:rPr lang="de-DE" dirty="0"/>
-              <a:t>–</a:t>
-            </a:r>
-            <a:r>
-              <a:rPr lang="en-US" dirty="0"/>
-              <a:t> API and DSL Design Patterns</a:t>
-            </a:r>
-          </a:p>
-        </p:txBody>
-      </p:sp>
+      <p:pic>
+        <p:nvPicPr>
+          <p:cNvPr id="9" name="Grafik 8"/>
+          <p:cNvPicPr>
+            <a:picLocks noChangeAspect="1"/>
+          </p:cNvPicPr>
+          <p:nvPr/>
+        </p:nvPicPr>
+        <p:blipFill>
+          <a:blip r:embed="rId2"/>
+          <a:stretch>
+            <a:fillRect/>
+          </a:stretch>
+        </p:blipFill>
+        <p:spPr>
+          <a:xfrm>
+            <a:off x="286908" y="220672"/>
+            <a:ext cx="8563702" cy="6449716"/>
+          </a:xfrm>
+          <a:prstGeom prst="rect">
+            <a:avLst/>
+          </a:prstGeom>
+        </p:spPr>
+      </p:pic>
     </p:spTree>
     <p:extLst>
       <p:ext uri="{BB962C8B-B14F-4D97-AF65-F5344CB8AC3E}">
-        <p14:creationId xmlns:p14="http://schemas.microsoft.com/office/powerpoint/2010/main" val="2610318552"/>
+        <p14:creationId xmlns:p14="http://schemas.microsoft.com/office/powerpoint/2010/main" val="3003166796"/>
       </p:ext>
     </p:extLst>
   </p:cSld>
@@ -27238,6 +27193,226 @@
           <a:lstStyle/>
           <a:p>
             <a:r>
+              <a:rPr lang="en-US" dirty="0" smtClean="0"/>
+              <a:t>Feedback and Opinions?</a:t>
+            </a:r>
+            <a:endParaRPr lang="en-US" dirty="0"/>
+          </a:p>
+        </p:txBody>
+      </p:sp>
+      <p:sp>
+        <p:nvSpPr>
+          <p:cNvPr id="3" name="Inhaltsplatzhalter 2"/>
+          <p:cNvSpPr>
+            <a:spLocks noGrp="1"/>
+          </p:cNvSpPr>
+          <p:nvPr>
+            <p:ph sz="quarter" idx="13"/>
+          </p:nvPr>
+        </p:nvSpPr>
+        <p:spPr>
+          <a:xfrm>
+            <a:off x="454195" y="1837639"/>
+            <a:ext cx="8235263" cy="3988027"/>
+          </a:xfrm>
+        </p:spPr>
+        <p:txBody>
+          <a:bodyPr/>
+          <a:lstStyle/>
+          <a:p>
+            <a:r>
+              <a:rPr lang="de-DE" dirty="0" err="1" smtClean="0"/>
+              <a:t>Examples</a:t>
+            </a:r>
+            <a:r>
+              <a:rPr lang="de-DE" dirty="0" smtClean="0"/>
+              <a:t> </a:t>
+            </a:r>
+            <a:r>
+              <a:rPr lang="de-DE" dirty="0" err="1" smtClean="0"/>
+              <a:t>repository</a:t>
+            </a:r>
+            <a:r>
+              <a:rPr lang="de-DE" dirty="0"/>
+              <a:t>: </a:t>
+            </a:r>
+            <a:br>
+              <a:rPr lang="de-DE" dirty="0"/>
+            </a:br>
+            <a:r>
+              <a:rPr lang="de-DE" dirty="0">
+                <a:hlinkClick r:id="rId2"/>
+              </a:rPr>
+              <a:t>https://github.com/Boereck/eclipsecon_france_2016-xtend_patterns</a:t>
+            </a:r>
+            <a:r>
+              <a:rPr lang="de-DE" dirty="0"/>
+              <a:t/>
+            </a:r>
+            <a:br>
+              <a:rPr lang="de-DE" dirty="0"/>
+            </a:br>
+            <a:endParaRPr lang="en-US" dirty="0"/>
+          </a:p>
+          <a:p>
+            <a:r>
+              <a:rPr lang="en-US" dirty="0" smtClean="0"/>
+              <a:t>Useful?</a:t>
+            </a:r>
+          </a:p>
+          <a:p>
+            <a:endParaRPr lang="en-US" dirty="0" smtClean="0"/>
+          </a:p>
+          <a:p>
+            <a:r>
+              <a:rPr lang="en-US" dirty="0" smtClean="0"/>
+              <a:t>Interesting?</a:t>
+            </a:r>
+          </a:p>
+          <a:p>
+            <a:endParaRPr lang="en-US" dirty="0" smtClean="0"/>
+          </a:p>
+          <a:p>
+            <a:r>
+              <a:rPr lang="en-US" dirty="0" smtClean="0"/>
+              <a:t>Impractical?</a:t>
+            </a:r>
+          </a:p>
+          <a:p>
+            <a:endParaRPr lang="en-US" dirty="0" smtClean="0"/>
+          </a:p>
+          <a:p>
+            <a:r>
+              <a:rPr lang="en-US" dirty="0" smtClean="0"/>
+              <a:t>Too obvious?</a:t>
+            </a:r>
+          </a:p>
+          <a:p>
+            <a:endParaRPr lang="en-US" dirty="0" smtClean="0"/>
+          </a:p>
+          <a:p>
+            <a:r>
+              <a:rPr lang="en-US" dirty="0" smtClean="0"/>
+              <a:t>What are your favorite patterns?</a:t>
+            </a:r>
+            <a:endParaRPr lang="en-US" dirty="0"/>
+          </a:p>
+        </p:txBody>
+      </p:sp>
+      <p:sp>
+        <p:nvSpPr>
+          <p:cNvPr id="4" name="Fußzeilenplatzhalter 3"/>
+          <p:cNvSpPr>
+            <a:spLocks noGrp="1"/>
+          </p:cNvSpPr>
+          <p:nvPr>
+            <p:ph type="ftr" sz="quarter" idx="3"/>
+          </p:nvPr>
+        </p:nvSpPr>
+        <p:spPr/>
+        <p:txBody>
+          <a:bodyPr/>
+          <a:lstStyle/>
+          <a:p>
+            <a:r>
+              <a:rPr lang="de-DE" smtClean="0">
+                <a:latin typeface="Arial"/>
+              </a:rPr>
+              <a:t>© Fraunhofer FOKUS</a:t>
+            </a:r>
+            <a:endParaRPr lang="de-DE" dirty="0">
+              <a:latin typeface="Arial"/>
+            </a:endParaRPr>
+          </a:p>
+        </p:txBody>
+      </p:sp>
+      <p:sp>
+        <p:nvSpPr>
+          <p:cNvPr id="5" name="Titel 4"/>
+          <p:cNvSpPr>
+            <a:spLocks noGrp="1"/>
+          </p:cNvSpPr>
+          <p:nvPr>
+            <p:ph type="ctrTitle"/>
+          </p:nvPr>
+        </p:nvSpPr>
+        <p:spPr/>
+        <p:txBody>
+          <a:bodyPr/>
+          <a:lstStyle/>
+          <a:p>
+            <a:r>
+              <a:rPr lang="en-US" dirty="0" err="1"/>
+              <a:t>Xtend</a:t>
+            </a:r>
+            <a:r>
+              <a:rPr lang="en-US" dirty="0"/>
+              <a:t> </a:t>
+            </a:r>
+            <a:r>
+              <a:rPr lang="de-DE" dirty="0"/>
+              <a:t>–</a:t>
+            </a:r>
+            <a:r>
+              <a:rPr lang="en-US" dirty="0"/>
+              <a:t> API and DSL Design Patterns</a:t>
+            </a:r>
+          </a:p>
+        </p:txBody>
+      </p:sp>
+    </p:spTree>
+    <p:extLst>
+      <p:ext uri="{BB962C8B-B14F-4D97-AF65-F5344CB8AC3E}">
+        <p14:creationId xmlns:p14="http://schemas.microsoft.com/office/powerpoint/2010/main" val="2610318552"/>
+      </p:ext>
+    </p:extLst>
+  </p:cSld>
+  <p:clrMapOvr>
+    <a:masterClrMapping/>
+  </p:clrMapOvr>
+  <p:timing>
+    <p:tnLst>
+      <p:par>
+        <p:cTn id="1" dur="indefinite" restart="never" nodeType="tmRoot"/>
+      </p:par>
+    </p:tnLst>
+  </p:timing>
+</p:sld>
+</file>
+
+<file path=ppt/slides/slide39.xml><?xml version="1.0" encoding="utf-8"?>
+<p:sld xmlns:a="http://schemas.openxmlformats.org/drawingml/2006/main" xmlns:r="http://schemas.openxmlformats.org/officeDocument/2006/relationships" xmlns:p="http://schemas.openxmlformats.org/presentationml/2006/main">
+  <p:cSld>
+    <p:spTree>
+      <p:nvGrpSpPr>
+        <p:cNvPr id="1" name=""/>
+        <p:cNvGrpSpPr/>
+        <p:nvPr/>
+      </p:nvGrpSpPr>
+      <p:grpSpPr>
+        <a:xfrm>
+          <a:off x="0" y="0"/>
+          <a:ext cx="0" cy="0"/>
+          <a:chOff x="0" y="0"/>
+          <a:chExt cx="0" cy="0"/>
+        </a:xfrm>
+      </p:grpSpPr>
+      <p:sp>
+        <p:nvSpPr>
+          <p:cNvPr id="2" name="Textplatzhalter 1"/>
+          <p:cNvSpPr>
+            <a:spLocks noGrp="1"/>
+          </p:cNvSpPr>
+          <p:nvPr>
+            <p:ph type="body" sz="quarter" idx="10"/>
+          </p:nvPr>
+        </p:nvSpPr>
+        <p:spPr/>
+        <p:txBody>
+          <a:bodyPr/>
+          <a:lstStyle/>
+          <a:p>
+            <a:r>
               <a:rPr lang="en-US" dirty="0"/>
               <a:t>Image Sources</a:t>
             </a:r>
@@ -27435,336 +27610,6 @@
   <p:clrMapOvr>
     <a:masterClrMapping/>
   </p:clrMapOvr>
-</p:sld>
-</file>
-
-<file path=ppt/slides/slide39.xml><?xml version="1.0" encoding="utf-8"?>
-<p:sld xmlns:a="http://schemas.openxmlformats.org/drawingml/2006/main" xmlns:r="http://schemas.openxmlformats.org/officeDocument/2006/relationships" xmlns:p="http://schemas.openxmlformats.org/presentationml/2006/main" show="0">
-  <p:cSld>
-    <p:spTree>
-      <p:nvGrpSpPr>
-        <p:cNvPr id="1" name=""/>
-        <p:cNvGrpSpPr/>
-        <p:nvPr/>
-      </p:nvGrpSpPr>
-      <p:grpSpPr>
-        <a:xfrm>
-          <a:off x="0" y="0"/>
-          <a:ext cx="0" cy="0"/>
-          <a:chOff x="0" y="0"/>
-          <a:chExt cx="0" cy="0"/>
-        </a:xfrm>
-      </p:grpSpPr>
-      <p:sp>
-        <p:nvSpPr>
-          <p:cNvPr id="2" name="Textplatzhalter 1"/>
-          <p:cNvSpPr>
-            <a:spLocks noGrp="1"/>
-          </p:cNvSpPr>
-          <p:nvPr>
-            <p:ph type="body" sz="quarter" idx="10"/>
-          </p:nvPr>
-        </p:nvSpPr>
-        <p:spPr/>
-        <p:txBody>
-          <a:bodyPr/>
-          <a:lstStyle/>
-          <a:p>
-            <a:r>
-              <a:rPr lang="en-US" dirty="0" smtClean="0"/>
-              <a:t>My </a:t>
-            </a:r>
-            <a:r>
-              <a:rPr lang="en-US" dirty="0" err="1" smtClean="0"/>
-              <a:t>Xtend</a:t>
-            </a:r>
-            <a:r>
-              <a:rPr lang="en-US" dirty="0" smtClean="0"/>
-              <a:t> Most Wanted Whish List</a:t>
-            </a:r>
-            <a:endParaRPr lang="en-US" dirty="0"/>
-          </a:p>
-        </p:txBody>
-      </p:sp>
-      <p:sp>
-        <p:nvSpPr>
-          <p:cNvPr id="3" name="Inhaltsplatzhalter 2"/>
-          <p:cNvSpPr>
-            <a:spLocks noGrp="1"/>
-          </p:cNvSpPr>
-          <p:nvPr>
-            <p:ph sz="quarter" idx="13"/>
-          </p:nvPr>
-        </p:nvSpPr>
-        <p:spPr>
-          <a:xfrm>
-            <a:off x="454195" y="1837639"/>
-            <a:ext cx="8235263" cy="3988027"/>
-          </a:xfrm>
-        </p:spPr>
-        <p:txBody>
-          <a:bodyPr/>
-          <a:lstStyle/>
-          <a:p>
-            <a:r>
-              <a:rPr lang="en-US" dirty="0" smtClean="0"/>
-              <a:t>Method references</a:t>
-            </a:r>
-          </a:p>
-          <a:p>
-            <a:endParaRPr lang="en-US" dirty="0" smtClean="0"/>
-          </a:p>
-          <a:p>
-            <a:r>
-              <a:rPr lang="en-US" dirty="0" smtClean="0"/>
-              <a:t>Default methods</a:t>
-            </a:r>
-          </a:p>
-          <a:p>
-            <a:endParaRPr lang="en-US" dirty="0" smtClean="0"/>
-          </a:p>
-          <a:p>
-            <a:r>
-              <a:rPr lang="en-US" dirty="0" smtClean="0"/>
-              <a:t>Compile auto-lambda-type-conversions to Java 8 method references, where possible</a:t>
-            </a:r>
-          </a:p>
-          <a:p>
-            <a:endParaRPr lang="en-US" dirty="0" smtClean="0"/>
-          </a:p>
-          <a:p>
-            <a:r>
-              <a:rPr lang="en-US" dirty="0" smtClean="0"/>
-              <a:t>Overloading call operator (also allow as extension method)</a:t>
-            </a:r>
-          </a:p>
-          <a:p>
-            <a:pPr marL="259592" lvl="1" indent="0">
-              <a:lnSpc>
-                <a:spcPct val="107000"/>
-              </a:lnSpc>
-              <a:buNone/>
-            </a:pPr>
-            <a:r>
-              <a:rPr lang="en-US" b="1" dirty="0" err="1" smtClean="0">
-                <a:solidFill>
-                  <a:srgbClr val="7F0055"/>
-                </a:solidFill>
-                <a:latin typeface="Consolas" panose="020B0609020204030204" pitchFamily="49" charset="0"/>
-                <a:ea typeface="Calibri" panose="020F0502020204030204" pitchFamily="34" charset="0"/>
-                <a:cs typeface="Times New Roman" panose="02020603050405020304" pitchFamily="18" charset="0"/>
-              </a:rPr>
-              <a:t>val</a:t>
-            </a:r>
-            <a:r>
-              <a:rPr lang="en-US" dirty="0" smtClean="0">
-                <a:solidFill>
-                  <a:srgbClr val="000000"/>
-                </a:solidFill>
-                <a:latin typeface="Consolas" panose="020B0609020204030204" pitchFamily="49" charset="0"/>
-                <a:ea typeface="Calibri" panose="020F0502020204030204" pitchFamily="34" charset="0"/>
-                <a:cs typeface="Times New Roman" panose="02020603050405020304" pitchFamily="18" charset="0"/>
-              </a:rPr>
-              <a:t> </a:t>
-            </a:r>
-            <a:r>
-              <a:rPr lang="en-US" dirty="0" err="1" smtClean="0">
-                <a:solidFill>
-                  <a:srgbClr val="000000"/>
-                </a:solidFill>
-                <a:latin typeface="Consolas" panose="020B0609020204030204" pitchFamily="49" charset="0"/>
-                <a:ea typeface="Calibri" panose="020F0502020204030204" pitchFamily="34" charset="0"/>
-                <a:cs typeface="Times New Roman" panose="02020603050405020304" pitchFamily="18" charset="0"/>
-              </a:rPr>
-              <a:t>nomnom</a:t>
-            </a:r>
-            <a:r>
-              <a:rPr lang="en-US" dirty="0" smtClean="0">
-                <a:solidFill>
-                  <a:srgbClr val="000000"/>
-                </a:solidFill>
-                <a:latin typeface="Consolas" panose="020B0609020204030204" pitchFamily="49" charset="0"/>
-                <a:ea typeface="Calibri" panose="020F0502020204030204" pitchFamily="34" charset="0"/>
-                <a:cs typeface="Times New Roman" panose="02020603050405020304" pitchFamily="18" charset="0"/>
-              </a:rPr>
-              <a:t> = [</a:t>
-            </a:r>
-            <a:r>
-              <a:rPr lang="en-US" dirty="0" smtClean="0">
-                <a:solidFill>
-                  <a:srgbClr val="2A00FF"/>
-                </a:solidFill>
-                <a:latin typeface="Consolas" panose="020B0609020204030204" pitchFamily="49" charset="0"/>
-                <a:ea typeface="Calibri" panose="020F0502020204030204" pitchFamily="34" charset="0"/>
-                <a:cs typeface="Times New Roman" panose="02020603050405020304" pitchFamily="18" charset="0"/>
-              </a:rPr>
-              <a:t>"banana"</a:t>
-            </a:r>
-            <a:r>
-              <a:rPr lang="en-US" dirty="0" smtClean="0">
-                <a:solidFill>
-                  <a:srgbClr val="000000"/>
-                </a:solidFill>
-                <a:latin typeface="Consolas" panose="020B0609020204030204" pitchFamily="49" charset="0"/>
-                <a:ea typeface="Calibri" panose="020F0502020204030204" pitchFamily="34" charset="0"/>
-                <a:cs typeface="Times New Roman" panose="02020603050405020304" pitchFamily="18" charset="0"/>
-              </a:rPr>
-              <a:t>]</a:t>
-            </a:r>
-            <a:endParaRPr lang="en-US" sz="2000" dirty="0">
-              <a:latin typeface="Calibri" panose="020F0502020204030204" pitchFamily="34" charset="0"/>
-              <a:ea typeface="Calibri" panose="020F0502020204030204" pitchFamily="34" charset="0"/>
-              <a:cs typeface="Times New Roman" panose="02020603050405020304" pitchFamily="18" charset="0"/>
-            </a:endParaRPr>
-          </a:p>
-          <a:p>
-            <a:pPr marL="259592" lvl="1" indent="0">
-              <a:lnSpc>
-                <a:spcPct val="107000"/>
-              </a:lnSpc>
-              <a:spcAft>
-                <a:spcPts val="800"/>
-              </a:spcAft>
-              <a:buNone/>
-            </a:pPr>
-            <a:r>
-              <a:rPr lang="en-US" dirty="0" err="1">
-                <a:solidFill>
-                  <a:srgbClr val="000000"/>
-                </a:solidFill>
-                <a:latin typeface="Consolas" panose="020B0609020204030204" pitchFamily="49" charset="0"/>
-                <a:ea typeface="Calibri" panose="020F0502020204030204" pitchFamily="34" charset="0"/>
-                <a:cs typeface="Times New Roman" panose="02020603050405020304" pitchFamily="18" charset="0"/>
-              </a:rPr>
-              <a:t>nomnom</a:t>
-            </a:r>
-            <a:r>
-              <a:rPr lang="en-US" dirty="0" smtClean="0">
-                <a:solidFill>
-                  <a:srgbClr val="000000"/>
-                </a:solidFill>
-                <a:latin typeface="Consolas" panose="020B0609020204030204" pitchFamily="49" charset="0"/>
-                <a:ea typeface="Calibri" panose="020F0502020204030204" pitchFamily="34" charset="0"/>
-                <a:cs typeface="Times New Roman" panose="02020603050405020304" pitchFamily="18" charset="0"/>
-              </a:rPr>
-              <a:t>()</a:t>
-            </a:r>
-            <a:br>
-              <a:rPr lang="en-US" dirty="0" smtClean="0">
-                <a:solidFill>
-                  <a:srgbClr val="000000"/>
-                </a:solidFill>
-                <a:latin typeface="Consolas" panose="020B0609020204030204" pitchFamily="49" charset="0"/>
-                <a:ea typeface="Calibri" panose="020F0502020204030204" pitchFamily="34" charset="0"/>
-                <a:cs typeface="Times New Roman" panose="02020603050405020304" pitchFamily="18" charset="0"/>
-              </a:rPr>
-            </a:br>
-            <a:endParaRPr lang="de-DE" dirty="0">
-              <a:solidFill>
-                <a:srgbClr val="000000"/>
-              </a:solidFill>
-              <a:latin typeface="Consolas" panose="020B0609020204030204" pitchFamily="49" charset="0"/>
-              <a:cs typeface="Times New Roman" panose="02020603050405020304" pitchFamily="18" charset="0"/>
-            </a:endParaRPr>
-          </a:p>
-          <a:p>
-            <a:r>
-              <a:rPr lang="en-US" dirty="0" smtClean="0"/>
-              <a:t>Pattern matching with decomposition</a:t>
-            </a:r>
-            <a:br>
-              <a:rPr lang="en-US" dirty="0" smtClean="0"/>
-            </a:br>
-            <a:endParaRPr lang="en-US" dirty="0" smtClean="0"/>
-          </a:p>
-          <a:p>
-            <a:r>
-              <a:rPr lang="en-US" dirty="0" smtClean="0"/>
-              <a:t>More flexible active annotations</a:t>
-            </a:r>
-            <a:endParaRPr lang="en-US" dirty="0"/>
-          </a:p>
-        </p:txBody>
-      </p:sp>
-      <p:sp>
-        <p:nvSpPr>
-          <p:cNvPr id="4" name="Fußzeilenplatzhalter 3"/>
-          <p:cNvSpPr>
-            <a:spLocks noGrp="1"/>
-          </p:cNvSpPr>
-          <p:nvPr>
-            <p:ph type="ftr" sz="quarter" idx="3"/>
-          </p:nvPr>
-        </p:nvSpPr>
-        <p:spPr/>
-        <p:txBody>
-          <a:bodyPr/>
-          <a:lstStyle/>
-          <a:p>
-            <a:r>
-              <a:rPr lang="de-DE" smtClean="0">
-                <a:latin typeface="Arial"/>
-              </a:rPr>
-              <a:t>© Fraunhofer FOKUS</a:t>
-            </a:r>
-            <a:endParaRPr lang="de-DE" dirty="0">
-              <a:latin typeface="Arial"/>
-            </a:endParaRPr>
-          </a:p>
-        </p:txBody>
-      </p:sp>
-      <p:sp>
-        <p:nvSpPr>
-          <p:cNvPr id="5" name="Titel 4"/>
-          <p:cNvSpPr>
-            <a:spLocks noGrp="1"/>
-          </p:cNvSpPr>
-          <p:nvPr>
-            <p:ph type="ctrTitle"/>
-          </p:nvPr>
-        </p:nvSpPr>
-        <p:spPr/>
-        <p:txBody>
-          <a:bodyPr/>
-          <a:lstStyle/>
-          <a:p>
-            <a:r>
-              <a:rPr lang="en-US" dirty="0" err="1"/>
-              <a:t>Xtend</a:t>
-            </a:r>
-            <a:r>
-              <a:rPr lang="en-US" dirty="0"/>
-              <a:t> </a:t>
-            </a:r>
-            <a:r>
-              <a:rPr lang="de-DE" dirty="0"/>
-              <a:t>–</a:t>
-            </a:r>
-            <a:r>
-              <a:rPr lang="en-US" dirty="0"/>
-              <a:t> API and DSL Design Patterns</a:t>
-            </a:r>
-          </a:p>
-        </p:txBody>
-      </p:sp>
-    </p:spTree>
-    <p:extLst>
-      <p:ext uri="{BB962C8B-B14F-4D97-AF65-F5344CB8AC3E}">
-        <p14:creationId xmlns:p14="http://schemas.microsoft.com/office/powerpoint/2010/main" val="3648679931"/>
-      </p:ext>
-    </p:extLst>
-  </p:cSld>
-  <p:clrMapOvr>
-    <a:masterClrMapping/>
-  </p:clrMapOvr>
-  <mc:AlternateContent xmlns:mc="http://schemas.openxmlformats.org/markup-compatibility/2006" xmlns:p14="http://schemas.microsoft.com/office/powerpoint/2010/main">
-    <mc:Choice Requires="p14">
-      <p:transition spd="slow" p14:dur="2000"/>
-    </mc:Choice>
-    <mc:Fallback xmlns="">
-      <p:transition spd="slow"/>
-    </mc:Fallback>
-  </mc:AlternateContent>
   <p:timing>
     <p:tnLst>
       <p:par>
@@ -29085,6 +28930,343 @@
 </file>
 
 <file path=ppt/slides/slide40.xml><?xml version="1.0" encoding="utf-8"?>
+<p:sld xmlns:a="http://schemas.openxmlformats.org/drawingml/2006/main" xmlns:r="http://schemas.openxmlformats.org/officeDocument/2006/relationships" xmlns:p="http://schemas.openxmlformats.org/presentationml/2006/main" show="0">
+  <p:cSld>
+    <p:spTree>
+      <p:nvGrpSpPr>
+        <p:cNvPr id="1" name=""/>
+        <p:cNvGrpSpPr/>
+        <p:nvPr/>
+      </p:nvGrpSpPr>
+      <p:grpSpPr>
+        <a:xfrm>
+          <a:off x="0" y="0"/>
+          <a:ext cx="0" cy="0"/>
+          <a:chOff x="0" y="0"/>
+          <a:chExt cx="0" cy="0"/>
+        </a:xfrm>
+      </p:grpSpPr>
+      <p:sp>
+        <p:nvSpPr>
+          <p:cNvPr id="2" name="Textplatzhalter 1"/>
+          <p:cNvSpPr>
+            <a:spLocks noGrp="1"/>
+          </p:cNvSpPr>
+          <p:nvPr>
+            <p:ph type="body" sz="quarter" idx="10"/>
+          </p:nvPr>
+        </p:nvSpPr>
+        <p:spPr/>
+        <p:txBody>
+          <a:bodyPr/>
+          <a:lstStyle/>
+          <a:p>
+            <a:r>
+              <a:rPr lang="en-US" dirty="0" smtClean="0"/>
+              <a:t>My </a:t>
+            </a:r>
+            <a:r>
+              <a:rPr lang="en-US" dirty="0" err="1" smtClean="0"/>
+              <a:t>Xtend</a:t>
+            </a:r>
+            <a:r>
+              <a:rPr lang="en-US" dirty="0" smtClean="0"/>
+              <a:t> Most Wanted Whish List</a:t>
+            </a:r>
+            <a:endParaRPr lang="en-US" dirty="0"/>
+          </a:p>
+        </p:txBody>
+      </p:sp>
+      <p:sp>
+        <p:nvSpPr>
+          <p:cNvPr id="3" name="Inhaltsplatzhalter 2"/>
+          <p:cNvSpPr>
+            <a:spLocks noGrp="1"/>
+          </p:cNvSpPr>
+          <p:nvPr>
+            <p:ph sz="quarter" idx="13"/>
+          </p:nvPr>
+        </p:nvSpPr>
+        <p:spPr>
+          <a:xfrm>
+            <a:off x="454195" y="1837639"/>
+            <a:ext cx="8235263" cy="3988027"/>
+          </a:xfrm>
+        </p:spPr>
+        <p:txBody>
+          <a:bodyPr/>
+          <a:lstStyle/>
+          <a:p>
+            <a:r>
+              <a:rPr lang="en-US" dirty="0" smtClean="0"/>
+              <a:t>Method references</a:t>
+            </a:r>
+          </a:p>
+          <a:p>
+            <a:endParaRPr lang="en-US" dirty="0" smtClean="0"/>
+          </a:p>
+          <a:p>
+            <a:r>
+              <a:rPr lang="en-US" dirty="0" smtClean="0"/>
+              <a:t>Default methods</a:t>
+            </a:r>
+          </a:p>
+          <a:p>
+            <a:endParaRPr lang="en-US" dirty="0" smtClean="0"/>
+          </a:p>
+          <a:p>
+            <a:r>
+              <a:rPr lang="en-US" dirty="0" smtClean="0"/>
+              <a:t>Compile auto-lambda-type-conversions to Java 8 method references, where possible</a:t>
+            </a:r>
+          </a:p>
+          <a:p>
+            <a:endParaRPr lang="en-US" dirty="0" smtClean="0"/>
+          </a:p>
+          <a:p>
+            <a:r>
+              <a:rPr lang="en-US" dirty="0" smtClean="0"/>
+              <a:t>Overloading call operator (also allow as extension method)</a:t>
+            </a:r>
+          </a:p>
+          <a:p>
+            <a:pPr marL="259592" lvl="1" indent="0">
+              <a:lnSpc>
+                <a:spcPct val="107000"/>
+              </a:lnSpc>
+              <a:buNone/>
+            </a:pPr>
+            <a:r>
+              <a:rPr lang="en-US" b="1" dirty="0" err="1" smtClean="0">
+                <a:solidFill>
+                  <a:srgbClr val="7F0055"/>
+                </a:solidFill>
+                <a:latin typeface="Consolas" panose="020B0609020204030204" pitchFamily="49" charset="0"/>
+                <a:ea typeface="Calibri" panose="020F0502020204030204" pitchFamily="34" charset="0"/>
+                <a:cs typeface="Times New Roman" panose="02020603050405020304" pitchFamily="18" charset="0"/>
+              </a:rPr>
+              <a:t>val</a:t>
+            </a:r>
+            <a:r>
+              <a:rPr lang="en-US" dirty="0" smtClean="0">
+                <a:solidFill>
+                  <a:srgbClr val="000000"/>
+                </a:solidFill>
+                <a:latin typeface="Consolas" panose="020B0609020204030204" pitchFamily="49" charset="0"/>
+                <a:ea typeface="Calibri" panose="020F0502020204030204" pitchFamily="34" charset="0"/>
+                <a:cs typeface="Times New Roman" panose="02020603050405020304" pitchFamily="18" charset="0"/>
+              </a:rPr>
+              <a:t> </a:t>
+            </a:r>
+            <a:r>
+              <a:rPr lang="en-US" dirty="0" err="1" smtClean="0">
+                <a:solidFill>
+                  <a:srgbClr val="000000"/>
+                </a:solidFill>
+                <a:latin typeface="Consolas" panose="020B0609020204030204" pitchFamily="49" charset="0"/>
+                <a:ea typeface="Calibri" panose="020F0502020204030204" pitchFamily="34" charset="0"/>
+                <a:cs typeface="Times New Roman" panose="02020603050405020304" pitchFamily="18" charset="0"/>
+              </a:rPr>
+              <a:t>nomnom</a:t>
+            </a:r>
+            <a:r>
+              <a:rPr lang="en-US" dirty="0" smtClean="0">
+                <a:solidFill>
+                  <a:srgbClr val="000000"/>
+                </a:solidFill>
+                <a:latin typeface="Consolas" panose="020B0609020204030204" pitchFamily="49" charset="0"/>
+                <a:ea typeface="Calibri" panose="020F0502020204030204" pitchFamily="34" charset="0"/>
+                <a:cs typeface="Times New Roman" panose="02020603050405020304" pitchFamily="18" charset="0"/>
+              </a:rPr>
+              <a:t> = [</a:t>
+            </a:r>
+            <a:r>
+              <a:rPr lang="en-US" dirty="0" smtClean="0">
+                <a:solidFill>
+                  <a:srgbClr val="2A00FF"/>
+                </a:solidFill>
+                <a:latin typeface="Consolas" panose="020B0609020204030204" pitchFamily="49" charset="0"/>
+                <a:ea typeface="Calibri" panose="020F0502020204030204" pitchFamily="34" charset="0"/>
+                <a:cs typeface="Times New Roman" panose="02020603050405020304" pitchFamily="18" charset="0"/>
+              </a:rPr>
+              <a:t>"banana"</a:t>
+            </a:r>
+            <a:r>
+              <a:rPr lang="en-US" dirty="0" smtClean="0">
+                <a:solidFill>
+                  <a:srgbClr val="000000"/>
+                </a:solidFill>
+                <a:latin typeface="Consolas" panose="020B0609020204030204" pitchFamily="49" charset="0"/>
+                <a:ea typeface="Calibri" panose="020F0502020204030204" pitchFamily="34" charset="0"/>
+                <a:cs typeface="Times New Roman" panose="02020603050405020304" pitchFamily="18" charset="0"/>
+              </a:rPr>
+              <a:t>]</a:t>
+            </a:r>
+            <a:endParaRPr lang="en-US" sz="2000" dirty="0">
+              <a:latin typeface="Calibri" panose="020F0502020204030204" pitchFamily="34" charset="0"/>
+              <a:ea typeface="Calibri" panose="020F0502020204030204" pitchFamily="34" charset="0"/>
+              <a:cs typeface="Times New Roman" panose="02020603050405020304" pitchFamily="18" charset="0"/>
+            </a:endParaRPr>
+          </a:p>
+          <a:p>
+            <a:pPr marL="259592" lvl="1" indent="0">
+              <a:lnSpc>
+                <a:spcPct val="107000"/>
+              </a:lnSpc>
+              <a:spcAft>
+                <a:spcPts val="800"/>
+              </a:spcAft>
+              <a:buNone/>
+            </a:pPr>
+            <a:r>
+              <a:rPr lang="en-US" dirty="0" err="1">
+                <a:solidFill>
+                  <a:srgbClr val="000000"/>
+                </a:solidFill>
+                <a:latin typeface="Consolas" panose="020B0609020204030204" pitchFamily="49" charset="0"/>
+                <a:ea typeface="Calibri" panose="020F0502020204030204" pitchFamily="34" charset="0"/>
+                <a:cs typeface="Times New Roman" panose="02020603050405020304" pitchFamily="18" charset="0"/>
+              </a:rPr>
+              <a:t>nomnom</a:t>
+            </a:r>
+            <a:r>
+              <a:rPr lang="en-US" dirty="0" smtClean="0">
+                <a:solidFill>
+                  <a:srgbClr val="000000"/>
+                </a:solidFill>
+                <a:latin typeface="Consolas" panose="020B0609020204030204" pitchFamily="49" charset="0"/>
+                <a:ea typeface="Calibri" panose="020F0502020204030204" pitchFamily="34" charset="0"/>
+                <a:cs typeface="Times New Roman" panose="02020603050405020304" pitchFamily="18" charset="0"/>
+              </a:rPr>
+              <a:t>()</a:t>
+            </a:r>
+            <a:br>
+              <a:rPr lang="en-US" dirty="0" smtClean="0">
+                <a:solidFill>
+                  <a:srgbClr val="000000"/>
+                </a:solidFill>
+                <a:latin typeface="Consolas" panose="020B0609020204030204" pitchFamily="49" charset="0"/>
+                <a:ea typeface="Calibri" panose="020F0502020204030204" pitchFamily="34" charset="0"/>
+                <a:cs typeface="Times New Roman" panose="02020603050405020304" pitchFamily="18" charset="0"/>
+              </a:rPr>
+            </a:br>
+            <a:endParaRPr lang="de-DE" dirty="0">
+              <a:solidFill>
+                <a:srgbClr val="000000"/>
+              </a:solidFill>
+              <a:latin typeface="Consolas" panose="020B0609020204030204" pitchFamily="49" charset="0"/>
+              <a:cs typeface="Times New Roman" panose="02020603050405020304" pitchFamily="18" charset="0"/>
+            </a:endParaRPr>
+          </a:p>
+          <a:p>
+            <a:r>
+              <a:rPr lang="en-US" dirty="0" smtClean="0"/>
+              <a:t>Pattern matching with decomposition</a:t>
+            </a:r>
+            <a:br>
+              <a:rPr lang="en-US" dirty="0" smtClean="0"/>
+            </a:br>
+            <a:endParaRPr lang="en-US" dirty="0" smtClean="0"/>
+          </a:p>
+          <a:p>
+            <a:r>
+              <a:rPr lang="en-US" dirty="0" smtClean="0"/>
+              <a:t>More flexible active annotations</a:t>
+            </a:r>
+            <a:endParaRPr lang="en-US" dirty="0"/>
+          </a:p>
+        </p:txBody>
+      </p:sp>
+      <p:sp>
+        <p:nvSpPr>
+          <p:cNvPr id="4" name="Fußzeilenplatzhalter 3"/>
+          <p:cNvSpPr>
+            <a:spLocks noGrp="1"/>
+          </p:cNvSpPr>
+          <p:nvPr>
+            <p:ph type="ftr" sz="quarter" idx="3"/>
+          </p:nvPr>
+        </p:nvSpPr>
+        <p:spPr/>
+        <p:txBody>
+          <a:bodyPr/>
+          <a:lstStyle/>
+          <a:p>
+            <a:r>
+              <a:rPr lang="de-DE" smtClean="0">
+                <a:latin typeface="Arial"/>
+              </a:rPr>
+              <a:t>© Fraunhofer FOKUS</a:t>
+            </a:r>
+            <a:endParaRPr lang="de-DE" dirty="0">
+              <a:latin typeface="Arial"/>
+            </a:endParaRPr>
+          </a:p>
+        </p:txBody>
+      </p:sp>
+      <p:sp>
+        <p:nvSpPr>
+          <p:cNvPr id="5" name="Titel 4"/>
+          <p:cNvSpPr>
+            <a:spLocks noGrp="1"/>
+          </p:cNvSpPr>
+          <p:nvPr>
+            <p:ph type="ctrTitle"/>
+          </p:nvPr>
+        </p:nvSpPr>
+        <p:spPr/>
+        <p:txBody>
+          <a:bodyPr/>
+          <a:lstStyle/>
+          <a:p>
+            <a:r>
+              <a:rPr lang="en-US" dirty="0" err="1"/>
+              <a:t>Xtend</a:t>
+            </a:r>
+            <a:r>
+              <a:rPr lang="en-US" dirty="0"/>
+              <a:t> </a:t>
+            </a:r>
+            <a:r>
+              <a:rPr lang="de-DE" dirty="0"/>
+              <a:t>–</a:t>
+            </a:r>
+            <a:r>
+              <a:rPr lang="en-US" dirty="0"/>
+              <a:t> API and DSL Design Patterns</a:t>
+            </a:r>
+          </a:p>
+        </p:txBody>
+      </p:sp>
+    </p:spTree>
+    <p:extLst>
+      <p:ext uri="{BB962C8B-B14F-4D97-AF65-F5344CB8AC3E}">
+        <p14:creationId xmlns:p14="http://schemas.microsoft.com/office/powerpoint/2010/main" val="3648679931"/>
+      </p:ext>
+    </p:extLst>
+  </p:cSld>
+  <p:clrMapOvr>
+    <a:masterClrMapping/>
+  </p:clrMapOvr>
+  <mc:AlternateContent xmlns:mc="http://schemas.openxmlformats.org/markup-compatibility/2006" xmlns:p14="http://schemas.microsoft.com/office/powerpoint/2010/main">
+    <mc:Choice Requires="p14">
+      <p:transition spd="slow" p14:dur="2000"/>
+    </mc:Choice>
+    <mc:Fallback xmlns="">
+      <p:transition spd="slow"/>
+    </mc:Fallback>
+  </mc:AlternateContent>
+  <p:timing>
+    <p:tnLst>
+      <p:par>
+        <p:cTn id="1" dur="indefinite" restart="never" nodeType="tmRoot"/>
+      </p:par>
+    </p:tnLst>
+  </p:timing>
+</p:sld>
+</file>
+
+<file path=ppt/slides/slide41.xml><?xml version="1.0" encoding="utf-8"?>
 <p:sld xmlns:a="http://schemas.openxmlformats.org/drawingml/2006/main" xmlns:r="http://schemas.openxmlformats.org/officeDocument/2006/relationships" xmlns:p="http://schemas.openxmlformats.org/presentationml/2006/main">
   <p:cSld>
     <p:spTree>

</xml_diff>